<commit_message>
Fractal noise + colouring.
Made fractal noise by combing samples and implementing more changes for the method that combines them. Meaning more customization noise.

Added colour settings within the editor.

Overall i think this will be it for the generation part of the noise, now its just applying it to a map.
</commit_message>
<xml_diff>
--- a/Brief overview.pptx
+++ b/Brief overview.pptx
@@ -107,6 +107,11 @@
       </a:defRPr>
     </a:lvl9pPr>
   </p:defaultTextStyle>
+  <p:extLst>
+    <p:ext uri="{EFAFB233-063F-42B5-8137-9DF3F51BA10A}">
+      <p15:sldGuideLst xmlns:p15="http://schemas.microsoft.com/office/powerpoint/2012/main"/>
+    </p:ext>
+  </p:extLst>
 </p:presentation>
 </file>
 
@@ -192,7 +197,7 @@
           <a:p>
             <a:fld id="{8CB10BF1-9EA3-4C0E-9917-2CCD7ECA2817}" type="datetimeFigureOut">
               <a:rPr lang="en-GB" smtClean="0"/>
-              <a:t>11/02/2021</a:t>
+              <a:t>12/02/2021</a:t>
             </a:fld>
             <a:endParaRPr lang="en-GB"/>
           </a:p>
@@ -506,7 +511,7 @@
           <a:p>
             <a:r>
               <a:rPr lang="en-GB" dirty="0"/>
-              <a:t>So far. Customisable noise generation.   Old version had spawn point based system, but I realised I could do better and learn it properly.</a:t>
+              <a:t>So far. Customisable noise generation.   Old version had spawn point based system, but I realised I could do better and learn it properly. The map should be saveable based on seed.</a:t>
             </a:r>
           </a:p>
         </p:txBody>
@@ -696,7 +701,7 @@
           <a:p>
             <a:fld id="{42DD56F2-EDBF-4072-A6D3-87284AB272FD}" type="datetimeFigureOut">
               <a:rPr lang="en-GB" smtClean="0"/>
-              <a:t>11/02/2021</a:t>
+              <a:t>12/02/2021</a:t>
             </a:fld>
             <a:endParaRPr lang="en-GB"/>
           </a:p>
@@ -896,7 +901,7 @@
           <a:p>
             <a:fld id="{42DD56F2-EDBF-4072-A6D3-87284AB272FD}" type="datetimeFigureOut">
               <a:rPr lang="en-GB" smtClean="0"/>
-              <a:t>11/02/2021</a:t>
+              <a:t>12/02/2021</a:t>
             </a:fld>
             <a:endParaRPr lang="en-GB"/>
           </a:p>
@@ -1106,7 +1111,7 @@
           <a:p>
             <a:fld id="{42DD56F2-EDBF-4072-A6D3-87284AB272FD}" type="datetimeFigureOut">
               <a:rPr lang="en-GB" smtClean="0"/>
-              <a:t>11/02/2021</a:t>
+              <a:t>12/02/2021</a:t>
             </a:fld>
             <a:endParaRPr lang="en-GB"/>
           </a:p>
@@ -1306,7 +1311,7 @@
           <a:p>
             <a:fld id="{42DD56F2-EDBF-4072-A6D3-87284AB272FD}" type="datetimeFigureOut">
               <a:rPr lang="en-GB" smtClean="0"/>
-              <a:t>11/02/2021</a:t>
+              <a:t>12/02/2021</a:t>
             </a:fld>
             <a:endParaRPr lang="en-GB"/>
           </a:p>
@@ -1582,7 +1587,7 @@
           <a:p>
             <a:fld id="{42DD56F2-EDBF-4072-A6D3-87284AB272FD}" type="datetimeFigureOut">
               <a:rPr lang="en-GB" smtClean="0"/>
-              <a:t>11/02/2021</a:t>
+              <a:t>12/02/2021</a:t>
             </a:fld>
             <a:endParaRPr lang="en-GB"/>
           </a:p>
@@ -1850,7 +1855,7 @@
           <a:p>
             <a:fld id="{42DD56F2-EDBF-4072-A6D3-87284AB272FD}" type="datetimeFigureOut">
               <a:rPr lang="en-GB" smtClean="0"/>
-              <a:t>11/02/2021</a:t>
+              <a:t>12/02/2021</a:t>
             </a:fld>
             <a:endParaRPr lang="en-GB"/>
           </a:p>
@@ -2265,7 +2270,7 @@
           <a:p>
             <a:fld id="{42DD56F2-EDBF-4072-A6D3-87284AB272FD}" type="datetimeFigureOut">
               <a:rPr lang="en-GB" smtClean="0"/>
-              <a:t>11/02/2021</a:t>
+              <a:t>12/02/2021</a:t>
             </a:fld>
             <a:endParaRPr lang="en-GB"/>
           </a:p>
@@ -2407,7 +2412,7 @@
           <a:p>
             <a:fld id="{42DD56F2-EDBF-4072-A6D3-87284AB272FD}" type="datetimeFigureOut">
               <a:rPr lang="en-GB" smtClean="0"/>
-              <a:t>11/02/2021</a:t>
+              <a:t>12/02/2021</a:t>
             </a:fld>
             <a:endParaRPr lang="en-GB"/>
           </a:p>
@@ -2520,7 +2525,7 @@
           <a:p>
             <a:fld id="{42DD56F2-EDBF-4072-A6D3-87284AB272FD}" type="datetimeFigureOut">
               <a:rPr lang="en-GB" smtClean="0"/>
-              <a:t>11/02/2021</a:t>
+              <a:t>12/02/2021</a:t>
             </a:fld>
             <a:endParaRPr lang="en-GB"/>
           </a:p>
@@ -2833,7 +2838,7 @@
           <a:p>
             <a:fld id="{42DD56F2-EDBF-4072-A6D3-87284AB272FD}" type="datetimeFigureOut">
               <a:rPr lang="en-GB" smtClean="0"/>
-              <a:t>11/02/2021</a:t>
+              <a:t>12/02/2021</a:t>
             </a:fld>
             <a:endParaRPr lang="en-GB"/>
           </a:p>
@@ -3122,7 +3127,7 @@
           <a:p>
             <a:fld id="{42DD56F2-EDBF-4072-A6D3-87284AB272FD}" type="datetimeFigureOut">
               <a:rPr lang="en-GB" smtClean="0"/>
-              <a:t>11/02/2021</a:t>
+              <a:t>12/02/2021</a:t>
             </a:fld>
             <a:endParaRPr lang="en-GB"/>
           </a:p>
@@ -3365,7 +3370,7 @@
           <a:p>
             <a:fld id="{42DD56F2-EDBF-4072-A6D3-87284AB272FD}" type="datetimeFigureOut">
               <a:rPr lang="en-GB" smtClean="0"/>
-              <a:t>11/02/2021</a:t>
+              <a:t>12/02/2021</a:t>
             </a:fld>
             <a:endParaRPr lang="en-GB"/>
           </a:p>

</xml_diff>